<commit_message>
- Distance --> Cost to move.
</commit_message>
<xml_diff>
--- a/ smart-buy/Slides/Dynamic Programming.pptx
+++ b/ smart-buy/Slides/Dynamic Programming.pptx
@@ -114,7 +114,7 @@
   </p:defaultTextStyle>
   <p:extLst>
     <p:ext uri="{EFAFB233-063F-42B5-8137-9DF3F51BA10A}">
-      <p15:sldGuideLst xmlns="" xmlns:p15="http://schemas.microsoft.com/office/powerpoint/2012/main"/>
+      <p15:sldGuideLst xmlns:p15="http://schemas.microsoft.com/office/powerpoint/2012/main" xmlns=""/>
     </p:ext>
   </p:extLst>
 </p:presentation>
@@ -850,7 +850,7 @@
           <a:p>
             <a:fld id="{03828354-E0C5-4131-9B49-1997E3EE3A7D}" type="datetimeFigureOut">
               <a:rPr lang="en-US" smtClean="0"/>
-              <a:t>4/30/2014</a:t>
+              <a:t>5/5/2014</a:t>
             </a:fld>
             <a:endParaRPr lang="en-US"/>
           </a:p>
@@ -1101,7 +1101,7 @@
           <a:p>
             <a:fld id="{03828354-E0C5-4131-9B49-1997E3EE3A7D}" type="datetimeFigureOut">
               <a:rPr lang="en-US" smtClean="0"/>
-              <a:t>4/30/2014</a:t>
+              <a:t>5/5/2014</a:t>
             </a:fld>
             <a:endParaRPr lang="en-US"/>
           </a:p>
@@ -1415,7 +1415,7 @@
           <a:p>
             <a:fld id="{03828354-E0C5-4131-9B49-1997E3EE3A7D}" type="datetimeFigureOut">
               <a:rPr lang="en-US" smtClean="0"/>
-              <a:t>4/30/2014</a:t>
+              <a:t>5/5/2014</a:t>
             </a:fld>
             <a:endParaRPr lang="en-US"/>
           </a:p>
@@ -1756,7 +1756,7 @@
           <a:p>
             <a:fld id="{03828354-E0C5-4131-9B49-1997E3EE3A7D}" type="datetimeFigureOut">
               <a:rPr lang="en-US" smtClean="0"/>
-              <a:t>4/30/2014</a:t>
+              <a:t>5/5/2014</a:t>
             </a:fld>
             <a:endParaRPr lang="en-US"/>
           </a:p>
@@ -2070,7 +2070,7 @@
           <a:p>
             <a:fld id="{03828354-E0C5-4131-9B49-1997E3EE3A7D}" type="datetimeFigureOut">
               <a:rPr lang="en-US" smtClean="0"/>
-              <a:t>4/30/2014</a:t>
+              <a:t>5/5/2014</a:t>
             </a:fld>
             <a:endParaRPr lang="en-US"/>
           </a:p>
@@ -2463,7 +2463,7 @@
           <a:p>
             <a:fld id="{03828354-E0C5-4131-9B49-1997E3EE3A7D}" type="datetimeFigureOut">
               <a:rPr lang="en-US" smtClean="0"/>
-              <a:t>4/30/2014</a:t>
+              <a:t>5/5/2014</a:t>
             </a:fld>
             <a:endParaRPr lang="en-US"/>
           </a:p>
@@ -2633,7 +2633,7 @@
           <a:p>
             <a:fld id="{03828354-E0C5-4131-9B49-1997E3EE3A7D}" type="datetimeFigureOut">
               <a:rPr lang="en-US" smtClean="0"/>
-              <a:t>4/30/2014</a:t>
+              <a:t>5/5/2014</a:t>
             </a:fld>
             <a:endParaRPr lang="en-US"/>
           </a:p>
@@ -2813,7 +2813,7 @@
           <a:p>
             <a:fld id="{03828354-E0C5-4131-9B49-1997E3EE3A7D}" type="datetimeFigureOut">
               <a:rPr lang="en-US" smtClean="0"/>
-              <a:t>4/30/2014</a:t>
+              <a:t>5/5/2014</a:t>
             </a:fld>
             <a:endParaRPr lang="en-US"/>
           </a:p>
@@ -3023,7 +3023,7 @@
           <a:p>
             <a:fld id="{03828354-E0C5-4131-9B49-1997E3EE3A7D}" type="datetimeFigureOut">
               <a:rPr lang="en-US" smtClean="0"/>
-              <a:t>4/30/2014</a:t>
+              <a:t>5/5/2014</a:t>
             </a:fld>
             <a:endParaRPr lang="en-US"/>
           </a:p>
@@ -3270,7 +3270,7 @@
           <a:p>
             <a:fld id="{03828354-E0C5-4131-9B49-1997E3EE3A7D}" type="datetimeFigureOut">
               <a:rPr lang="en-US" smtClean="0"/>
-              <a:t>4/30/2014</a:t>
+              <a:t>5/5/2014</a:t>
             </a:fld>
             <a:endParaRPr lang="en-US"/>
           </a:p>
@@ -3502,7 +3502,7 @@
           <a:p>
             <a:fld id="{03828354-E0C5-4131-9B49-1997E3EE3A7D}" type="datetimeFigureOut">
               <a:rPr lang="en-US" smtClean="0"/>
-              <a:t>4/30/2014</a:t>
+              <a:t>5/5/2014</a:t>
             </a:fld>
             <a:endParaRPr lang="en-US"/>
           </a:p>
@@ -3876,7 +3876,7 @@
           <a:p>
             <a:fld id="{03828354-E0C5-4131-9B49-1997E3EE3A7D}" type="datetimeFigureOut">
               <a:rPr lang="en-US" smtClean="0"/>
-              <a:t>4/30/2014</a:t>
+              <a:t>5/5/2014</a:t>
             </a:fld>
             <a:endParaRPr lang="en-US"/>
           </a:p>
@@ -3999,7 +3999,7 @@
           <a:p>
             <a:fld id="{03828354-E0C5-4131-9B49-1997E3EE3A7D}" type="datetimeFigureOut">
               <a:rPr lang="en-US" smtClean="0"/>
-              <a:t>4/30/2014</a:t>
+              <a:t>5/5/2014</a:t>
             </a:fld>
             <a:endParaRPr lang="en-US"/>
           </a:p>
@@ -4094,7 +4094,7 @@
           <a:p>
             <a:fld id="{03828354-E0C5-4131-9B49-1997E3EE3A7D}" type="datetimeFigureOut">
               <a:rPr lang="en-US" smtClean="0"/>
-              <a:t>4/30/2014</a:t>
+              <a:t>5/5/2014</a:t>
             </a:fld>
             <a:endParaRPr lang="en-US"/>
           </a:p>
@@ -4349,7 +4349,7 @@
           <a:p>
             <a:fld id="{03828354-E0C5-4131-9B49-1997E3EE3A7D}" type="datetimeFigureOut">
               <a:rPr lang="en-US" smtClean="0"/>
-              <a:t>4/30/2014</a:t>
+              <a:t>5/5/2014</a:t>
             </a:fld>
             <a:endParaRPr lang="en-US"/>
           </a:p>
@@ -4612,7 +4612,7 @@
           <a:p>
             <a:fld id="{03828354-E0C5-4131-9B49-1997E3EE3A7D}" type="datetimeFigureOut">
               <a:rPr lang="en-US" smtClean="0"/>
-              <a:t>4/30/2014</a:t>
+              <a:t>5/5/2014</a:t>
             </a:fld>
             <a:endParaRPr lang="en-US"/>
           </a:p>
@@ -5355,7 +5355,7 @@
           <a:p>
             <a:fld id="{03828354-E0C5-4131-9B49-1997E3EE3A7D}" type="datetimeFigureOut">
               <a:rPr lang="en-US" smtClean="0"/>
-              <a:t>4/30/2014</a:t>
+              <a:t>5/5/2014</a:t>
             </a:fld>
             <a:endParaRPr lang="en-US"/>
           </a:p>
@@ -7219,7 +7219,15 @@
                 </a14:m>
                 <a:r>
                   <a:rPr lang="en-GB" dirty="0"/>
-                  <a:t> is the distance from market </a:t>
+                  <a:t> is the </a:t>
+                </a:r>
+                <a:r>
+                  <a:rPr lang="en-GB" dirty="0" smtClean="0"/>
+                  <a:t>cost to move from </a:t>
+                </a:r>
+                <a:r>
+                  <a:rPr lang="en-GB" dirty="0"/>
+                  <a:t>market </a:t>
                 </a:r>
                 <a:r>
                   <a:rPr lang="en-GB" i="1" dirty="0" err="1"/>
@@ -7750,8 +7758,8 @@
           </a:p>
         </p:txBody>
       </p:sp>
-      <mc:AlternateContent xmlns:mc="http://schemas.openxmlformats.org/markup-compatibility/2006" xmlns:a14="http://schemas.microsoft.com/office/drawing/2010/main">
-        <mc:Choice Requires="a14">
+      <mc:AlternateContent xmlns:mc="http://schemas.openxmlformats.org/markup-compatibility/2006">
+        <mc:Choice xmlns:a14="http://schemas.microsoft.com/office/drawing/2010/main" Requires="a14">
           <p:sp>
             <p:nvSpPr>
               <p:cNvPr id="3" name="Content Placeholder 2"/>
@@ -7818,7 +7826,15 @@
                 </a14:m>
                 <a:r>
                   <a:rPr lang="en-GB" dirty="0"/>
-                  <a:t> is the distance from start point to market </a:t>
+                  <a:t> is the </a:t>
+                </a:r>
+                <a:r>
+                  <a:rPr lang="en-GB" dirty="0" smtClean="0"/>
+                  <a:t>cost to move </a:t>
+                </a:r>
+                <a:r>
+                  <a:rPr lang="en-GB" dirty="0"/>
+                  <a:t>from start point to market </a:t>
                 </a:r>
                 <a:r>
                   <a:rPr lang="en-GB" i="1" dirty="0" err="1"/>
@@ -7881,7 +7897,19 @@
                 </a14:m>
                 <a:r>
                   <a:rPr lang="en-GB" dirty="0"/>
-                  <a:t> is the distance from end point to market </a:t>
+                  <a:t> is the </a:t>
+                </a:r>
+                <a:r>
+                  <a:rPr lang="en-GB" dirty="0" smtClean="0"/>
+                  <a:t>cost </a:t>
+                </a:r>
+                <a:r>
+                  <a:rPr lang="en-GB" smtClean="0"/>
+                  <a:t>to move from </a:t>
+                </a:r>
+                <a:r>
+                  <a:rPr lang="en-GB" dirty="0"/>
+                  <a:t>end point to market </a:t>
                 </a:r>
                 <a:r>
                   <a:rPr lang="en-GB" i="1" dirty="0" err="1"/>
@@ -8028,7 +8056,7 @@
             </p:txBody>
           </p:sp>
         </mc:Choice>
-        <mc:Fallback xmlns="">
+        <mc:Fallback>
           <p:sp>
             <p:nvSpPr>
               <p:cNvPr id="3" name="Content Placeholder 2"/>
@@ -10753,13 +10781,13 @@
   <p:clrMapOvr>
     <a:masterClrMapping/>
   </p:clrMapOvr>
-  <mc:AlternateContent xmlns:mc="http://schemas.openxmlformats.org/markup-compatibility/2006">
-    <mc:Choice xmlns:p14="http://schemas.microsoft.com/office/powerpoint/2010/main" Requires="p14">
+  <mc:AlternateContent xmlns:mc="http://schemas.openxmlformats.org/markup-compatibility/2006" xmlns:p14="http://schemas.microsoft.com/office/powerpoint/2010/main">
+    <mc:Choice Requires="p14">
       <p:transition spd="slow" p14:dur="3900">
         <p14:glitter pattern="hexagon"/>
       </p:transition>
     </mc:Choice>
-    <mc:Fallback>
+    <mc:Fallback xmlns="">
       <p:transition spd="slow">
         <p:fade/>
       </p:transition>
@@ -27813,13 +27841,13 @@
   <p:clrMapOvr>
     <a:masterClrMapping/>
   </p:clrMapOvr>
-  <mc:AlternateContent xmlns:mc="http://schemas.openxmlformats.org/markup-compatibility/2006">
-    <mc:Choice xmlns:p14="http://schemas.microsoft.com/office/powerpoint/2010/main" Requires="p14">
+  <mc:AlternateContent xmlns:mc="http://schemas.openxmlformats.org/markup-compatibility/2006" xmlns:p14="http://schemas.microsoft.com/office/powerpoint/2010/main">
+    <mc:Choice Requires="p14">
       <p:transition spd="slow" p14:dur="1600">
         <p:blinds dir="vert"/>
       </p:transition>
     </mc:Choice>
-    <mc:Fallback>
+    <mc:Fallback xmlns="">
       <p:transition spd="slow">
         <p:blinds dir="vert"/>
       </p:transition>
@@ -29932,13 +29960,13 @@
   <p:clrMapOvr>
     <a:masterClrMapping/>
   </p:clrMapOvr>
-  <mc:AlternateContent xmlns:mc="http://schemas.openxmlformats.org/markup-compatibility/2006">
-    <mc:Choice xmlns:p14="http://schemas.microsoft.com/office/powerpoint/2010/main" Requires="p14">
+  <mc:AlternateContent xmlns:mc="http://schemas.openxmlformats.org/markup-compatibility/2006" xmlns:p14="http://schemas.microsoft.com/office/powerpoint/2010/main">
+    <mc:Choice Requires="p14">
       <p:transition spd="slow" p14:dur="2500">
         <p:checker/>
       </p:transition>
     </mc:Choice>
-    <mc:Fallback>
+    <mc:Fallback xmlns="">
       <p:transition spd="slow">
         <p:checker/>
       </p:transition>
@@ -30350,7 +30378,7 @@
   <a:extraClrSchemeLst/>
   <a:extLst>
     <a:ext uri="{05A4C25C-085E-4340-85A3-A5531E510DB2}">
-      <thm15:themeFamily xmlns="" xmlns:thm15="http://schemas.microsoft.com/office/thememl/2012/main" name="Facet" id="{C0C680CD-088A-49FC-A102-D699147F32B2}" vid="{CFBC31BA-B70F-4F30-BCAA-4F3011E16C4D}"/>
+      <thm15:themeFamily xmlns:thm15="http://schemas.microsoft.com/office/thememl/2012/main" xmlns="" name="Facet" id="{C0C680CD-088A-49FC-A102-D699147F32B2}" vid="{CFBC31BA-B70F-4F30-BCAA-4F3011E16C4D}"/>
     </a:ext>
   </a:extLst>
 </a:theme>

</xml_diff>